<commit_message>
adding icons and resolving minor bugs
</commit_message>
<xml_diff>
--- a/docs/Sign.pptx
+++ b/docs/Sign.pptx
@@ -6,6 +6,7 @@
   </p:sldMasterIdLst>
   <p:sldIdLst>
     <p:sldId id="256" r:id="rId3"/>
+    <p:sldId id="257" r:id="rId4"/>
   </p:sldIdLst>
   <p:sldSz cx="12192000" cy="6858000"/>
   <p:notesSz cx="6858000" cy="9144000"/>
@@ -3308,6 +3309,404 @@
 </p:sld>
 </file>
 
+<file path=ppt/slides/slide2.xml><?xml version="1.0" encoding="utf-8"?>
+<p:sld xmlns:a="http://schemas.openxmlformats.org/drawingml/2006/main" xmlns:r="http://schemas.openxmlformats.org/officeDocument/2006/relationships" xmlns:p="http://schemas.openxmlformats.org/presentationml/2006/main">
+  <p:cSld>
+    <p:spTree>
+      <p:nvGrpSpPr>
+        <p:cNvPr id="1" name=""/>
+        <p:cNvGrpSpPr/>
+        <p:nvPr/>
+      </p:nvGrpSpPr>
+      <p:grpSpPr/>
+      <p:pic>
+        <p:nvPicPr>
+          <p:cNvPr id="4" name="Picture 3" descr="dnn"/>
+          <p:cNvPicPr>
+            <a:picLocks noChangeAspect="1"/>
+          </p:cNvPicPr>
+          <p:nvPr/>
+        </p:nvPicPr>
+        <p:blipFill>
+          <a:blip r:embed="rId1"/>
+          <a:stretch>
+            <a:fillRect/>
+          </a:stretch>
+        </p:blipFill>
+        <p:spPr>
+          <a:xfrm>
+            <a:off x="2988310" y="2098040"/>
+            <a:ext cx="2931795" cy="2931795"/>
+          </a:xfrm>
+          <a:prstGeom prst="rect">
+            <a:avLst/>
+          </a:prstGeom>
+        </p:spPr>
+      </p:pic>
+      <p:pic>
+        <p:nvPicPr>
+          <p:cNvPr id="5" name="Picture 4" descr="file"/>
+          <p:cNvPicPr>
+            <a:picLocks noChangeAspect="1"/>
+          </p:cNvPicPr>
+          <p:nvPr/>
+        </p:nvPicPr>
+        <p:blipFill>
+          <a:blip r:embed="rId2"/>
+          <a:stretch>
+            <a:fillRect/>
+          </a:stretch>
+        </p:blipFill>
+        <p:spPr>
+          <a:xfrm>
+            <a:off x="827405" y="2668270"/>
+            <a:ext cx="1363345" cy="1290955"/>
+          </a:xfrm>
+          <a:prstGeom prst="rect">
+            <a:avLst/>
+          </a:prstGeom>
+        </p:spPr>
+      </p:pic>
+      <p:pic>
+        <p:nvPicPr>
+          <p:cNvPr id="6" name="Picture 5" descr="knn"/>
+          <p:cNvPicPr>
+            <a:picLocks noChangeAspect="1"/>
+          </p:cNvPicPr>
+          <p:nvPr/>
+        </p:nvPicPr>
+        <p:blipFill>
+          <a:blip r:embed="rId3"/>
+          <a:stretch>
+            <a:fillRect/>
+          </a:stretch>
+        </p:blipFill>
+        <p:spPr>
+          <a:xfrm>
+            <a:off x="6617335" y="2512060"/>
+            <a:ext cx="2804160" cy="2103120"/>
+          </a:xfrm>
+          <a:prstGeom prst="rect">
+            <a:avLst/>
+          </a:prstGeom>
+        </p:spPr>
+      </p:pic>
+      <p:pic>
+        <p:nvPicPr>
+          <p:cNvPr id="7" name="Picture 6" descr="predictions"/>
+          <p:cNvPicPr>
+            <a:picLocks noChangeAspect="1"/>
+          </p:cNvPicPr>
+          <p:nvPr/>
+        </p:nvPicPr>
+        <p:blipFill>
+          <a:blip r:embed="rId4"/>
+          <a:stretch>
+            <a:fillRect/>
+          </a:stretch>
+        </p:blipFill>
+        <p:spPr>
+          <a:xfrm>
+            <a:off x="10239375" y="2965450"/>
+            <a:ext cx="993775" cy="993775"/>
+          </a:xfrm>
+          <a:prstGeom prst="rect">
+            <a:avLst/>
+          </a:prstGeom>
+        </p:spPr>
+      </p:pic>
+      <p:sp>
+        <p:nvSpPr>
+          <p:cNvPr id="8" name="Text Box 7"/>
+          <p:cNvSpPr txBox="1"/>
+          <p:nvPr/>
+        </p:nvSpPr>
+        <p:spPr>
+          <a:xfrm>
+            <a:off x="655955" y="3772535"/>
+            <a:ext cx="1985645" cy="368300"/>
+          </a:xfrm>
+          <a:prstGeom prst="rect">
+            <a:avLst/>
+          </a:prstGeom>
+          <a:noFill/>
+        </p:spPr>
+        <p:txBody>
+          <a:bodyPr wrap="square" rtlCol="0">
+            <a:spAutoFit/>
+          </a:bodyPr>
+          <a:p>
+            <a:r>
+              <a:rPr lang="en-IN" altLang="en-US" b="1">
+                <a:latin typeface="MV Boli" panose="02000500030200090000" charset="0"/>
+                <a:cs typeface="MV Boli" panose="02000500030200090000" charset="0"/>
+              </a:rPr>
+              <a:t>Input Images</a:t>
+            </a:r>
+            <a:endParaRPr lang="en-IN" altLang="en-US" b="1">
+              <a:latin typeface="MV Boli" panose="02000500030200090000" charset="0"/>
+              <a:cs typeface="MV Boli" panose="02000500030200090000" charset="0"/>
+            </a:endParaRPr>
+          </a:p>
+        </p:txBody>
+      </p:sp>
+      <p:sp>
+        <p:nvSpPr>
+          <p:cNvPr id="9" name="Text Box 8"/>
+          <p:cNvSpPr txBox="1"/>
+          <p:nvPr/>
+        </p:nvSpPr>
+        <p:spPr>
+          <a:xfrm>
+            <a:off x="3463290" y="4983480"/>
+            <a:ext cx="2230120" cy="645160"/>
+          </a:xfrm>
+          <a:prstGeom prst="rect">
+            <a:avLst/>
+          </a:prstGeom>
+          <a:noFill/>
+        </p:spPr>
+        <p:txBody>
+          <a:bodyPr wrap="square" rtlCol="0">
+            <a:spAutoFit/>
+          </a:bodyPr>
+          <a:p>
+            <a:pPr algn="ctr"/>
+            <a:r>
+              <a:rPr lang="en-IN" altLang="en-US" b="1">
+                <a:latin typeface="MV Boli" panose="02000500030200090000" charset="0"/>
+                <a:cs typeface="MV Boli" panose="02000500030200090000" charset="0"/>
+              </a:rPr>
+              <a:t>MobileNet Feature Extracion</a:t>
+            </a:r>
+            <a:endParaRPr lang="en-IN" altLang="en-US" b="1">
+              <a:latin typeface="MV Boli" panose="02000500030200090000" charset="0"/>
+              <a:cs typeface="MV Boli" panose="02000500030200090000" charset="0"/>
+            </a:endParaRPr>
+          </a:p>
+        </p:txBody>
+      </p:sp>
+      <p:sp>
+        <p:nvSpPr>
+          <p:cNvPr id="10" name="Text Box 9"/>
+          <p:cNvSpPr txBox="1"/>
+          <p:nvPr/>
+        </p:nvSpPr>
+        <p:spPr>
+          <a:xfrm>
+            <a:off x="7333615" y="4615180"/>
+            <a:ext cx="1799590" cy="368300"/>
+          </a:xfrm>
+          <a:prstGeom prst="rect">
+            <a:avLst/>
+          </a:prstGeom>
+          <a:noFill/>
+        </p:spPr>
+        <p:txBody>
+          <a:bodyPr wrap="square" rtlCol="0">
+            <a:spAutoFit/>
+          </a:bodyPr>
+          <a:p>
+            <a:r>
+              <a:rPr lang="en-IN" altLang="en-US" b="1">
+                <a:latin typeface="MV Boli" panose="02000500030200090000" charset="0"/>
+                <a:cs typeface="MV Boli" panose="02000500030200090000" charset="0"/>
+              </a:rPr>
+              <a:t>KNN Classifier</a:t>
+            </a:r>
+            <a:endParaRPr lang="en-IN" altLang="en-US" b="1">
+              <a:latin typeface="MV Boli" panose="02000500030200090000" charset="0"/>
+              <a:cs typeface="MV Boli" panose="02000500030200090000" charset="0"/>
+            </a:endParaRPr>
+          </a:p>
+        </p:txBody>
+      </p:sp>
+      <p:cxnSp>
+        <p:nvCxnSpPr>
+          <p:cNvPr id="12" name="Straight Arrow Connector 11"/>
+          <p:cNvCxnSpPr/>
+          <p:nvPr/>
+        </p:nvCxnSpPr>
+        <p:spPr>
+          <a:xfrm>
+            <a:off x="2190750" y="3563620"/>
+            <a:ext cx="671830" cy="0"/>
+          </a:xfrm>
+          <a:prstGeom prst="straightConnector1">
+            <a:avLst/>
+          </a:prstGeom>
+          <a:ln>
+            <a:solidFill>
+              <a:schemeClr val="tx1"/>
+            </a:solidFill>
+            <a:tailEnd type="arrow"/>
+          </a:ln>
+        </p:spPr>
+        <p:style>
+          <a:lnRef idx="1">
+            <a:schemeClr val="accent1"/>
+          </a:lnRef>
+          <a:fillRef idx="0">
+            <a:schemeClr val="accent1"/>
+          </a:fillRef>
+          <a:effectRef idx="0">
+            <a:schemeClr val="accent1"/>
+          </a:effectRef>
+          <a:fontRef idx="minor">
+            <a:schemeClr val="tx1"/>
+          </a:fontRef>
+        </p:style>
+      </p:cxnSp>
+      <p:cxnSp>
+        <p:nvCxnSpPr>
+          <p:cNvPr id="13" name="Straight Arrow Connector 12"/>
+          <p:cNvCxnSpPr/>
+          <p:nvPr/>
+        </p:nvCxnSpPr>
+        <p:spPr>
+          <a:xfrm>
+            <a:off x="5920105" y="3564255"/>
+            <a:ext cx="671830" cy="0"/>
+          </a:xfrm>
+          <a:prstGeom prst="straightConnector1">
+            <a:avLst/>
+          </a:prstGeom>
+          <a:ln>
+            <a:solidFill>
+              <a:schemeClr val="tx1"/>
+            </a:solidFill>
+            <a:tailEnd type="arrow"/>
+          </a:ln>
+        </p:spPr>
+        <p:style>
+          <a:lnRef idx="1">
+            <a:schemeClr val="accent1"/>
+          </a:lnRef>
+          <a:fillRef idx="0">
+            <a:schemeClr val="accent1"/>
+          </a:fillRef>
+          <a:effectRef idx="0">
+            <a:schemeClr val="accent1"/>
+          </a:effectRef>
+          <a:fontRef idx="minor">
+            <a:schemeClr val="tx1"/>
+          </a:fontRef>
+        </p:style>
+      </p:cxnSp>
+      <p:cxnSp>
+        <p:nvCxnSpPr>
+          <p:cNvPr id="14" name="Straight Arrow Connector 13"/>
+          <p:cNvCxnSpPr/>
+          <p:nvPr/>
+        </p:nvCxnSpPr>
+        <p:spPr>
+          <a:xfrm>
+            <a:off x="9421495" y="3564255"/>
+            <a:ext cx="671830" cy="0"/>
+          </a:xfrm>
+          <a:prstGeom prst="straightConnector1">
+            <a:avLst/>
+          </a:prstGeom>
+          <a:ln>
+            <a:solidFill>
+              <a:schemeClr val="tx1"/>
+            </a:solidFill>
+            <a:tailEnd type="arrow"/>
+          </a:ln>
+        </p:spPr>
+        <p:style>
+          <a:lnRef idx="1">
+            <a:schemeClr val="accent1"/>
+          </a:lnRef>
+          <a:fillRef idx="0">
+            <a:schemeClr val="accent1"/>
+          </a:fillRef>
+          <a:effectRef idx="0">
+            <a:schemeClr val="accent1"/>
+          </a:effectRef>
+          <a:fontRef idx="minor">
+            <a:schemeClr val="tx1"/>
+          </a:fontRef>
+        </p:style>
+      </p:cxnSp>
+      <p:sp>
+        <p:nvSpPr>
+          <p:cNvPr id="16" name="Text Box 15"/>
+          <p:cNvSpPr txBox="1"/>
+          <p:nvPr/>
+        </p:nvSpPr>
+        <p:spPr>
+          <a:xfrm>
+            <a:off x="2773680" y="1543050"/>
+            <a:ext cx="6965315" cy="368300"/>
+          </a:xfrm>
+          <a:prstGeom prst="rect">
+            <a:avLst/>
+          </a:prstGeom>
+          <a:noFill/>
+        </p:spPr>
+        <p:txBody>
+          <a:bodyPr wrap="square" rtlCol="0">
+            <a:spAutoFit/>
+          </a:bodyPr>
+          <a:p>
+            <a:r>
+              <a:rPr lang="en-IN" altLang="en-US" b="1">
+                <a:latin typeface="Segoe Print" panose="02000600000000000000" charset="0"/>
+                <a:cs typeface="Segoe Print" panose="02000600000000000000" charset="0"/>
+              </a:rPr>
+              <a:t>Practice Alphabets and Phrases Machine learning Model</a:t>
+            </a:r>
+            <a:endParaRPr lang="en-IN" altLang="en-US" b="1">
+              <a:latin typeface="Segoe Print" panose="02000600000000000000" charset="0"/>
+              <a:cs typeface="Segoe Print" panose="02000600000000000000" charset="0"/>
+            </a:endParaRPr>
+          </a:p>
+        </p:txBody>
+      </p:sp>
+      <p:sp>
+        <p:nvSpPr>
+          <p:cNvPr id="11" name="Text Box 10"/>
+          <p:cNvSpPr txBox="1"/>
+          <p:nvPr/>
+        </p:nvSpPr>
+        <p:spPr>
+          <a:xfrm>
+            <a:off x="10093325" y="4140835"/>
+            <a:ext cx="1291590" cy="368300"/>
+          </a:xfrm>
+          <a:prstGeom prst="rect">
+            <a:avLst/>
+          </a:prstGeom>
+          <a:noFill/>
+        </p:spPr>
+        <p:txBody>
+          <a:bodyPr wrap="square" rtlCol="0">
+            <a:spAutoFit/>
+          </a:bodyPr>
+          <a:p>
+            <a:r>
+              <a:rPr lang="en-IN" altLang="en-US" b="1">
+                <a:latin typeface="MV Boli" panose="02000500030200090000" charset="0"/>
+                <a:cs typeface="MV Boli" panose="02000500030200090000" charset="0"/>
+              </a:rPr>
+              <a:t>Prediction</a:t>
+            </a:r>
+            <a:endParaRPr lang="en-IN" altLang="en-US" b="1">
+              <a:latin typeface="MV Boli" panose="02000500030200090000" charset="0"/>
+              <a:cs typeface="MV Boli" panose="02000500030200090000" charset="0"/>
+            </a:endParaRPr>
+          </a:p>
+        </p:txBody>
+      </p:sp>
+    </p:spTree>
+  </p:cSld>
+  <p:clrMapOvr>
+    <a:masterClrMapping/>
+  </p:clrMapOvr>
+</p:sld>
+</file>
+
 <file path=ppt/theme/theme1.xml><?xml version="1.0" encoding="utf-8"?>
 <a:theme xmlns:a="http://schemas.openxmlformats.org/drawingml/2006/main" name="Office Theme">
   <a:themeElements>

</xml_diff>